<commit_message>
Try autogluon on my data
</commit_message>
<xml_diff>
--- a/PPT_Laurea/Bozza_Tesi_GC.pptx
+++ b/PPT_Laurea/Bozza_Tesi_GC.pptx
@@ -207,7 +207,7 @@
           <a:p>
             <a:fld id="{25575A16-D73A-4FA2-8460-4D98611F2887}" type="datetimeFigureOut">
               <a:rPr lang="it-IT" smtClean="0"/>
-              <a:t>14/02/2024</a:t>
+              <a:t>21/02/2024</a:t>
             </a:fld>
             <a:endParaRPr lang="it-IT"/>
           </a:p>
@@ -784,7 +784,7 @@
           <a:p>
             <a:fld id="{39739E87-54E7-4FF4-B39E-952D39B43CEE}" type="datetime1">
               <a:rPr lang="en-US" smtClean="0"/>
-              <a:t>2/14/2024</a:t>
+              <a:t>2/21/2024</a:t>
             </a:fld>
             <a:endParaRPr lang="en-US" dirty="0"/>
           </a:p>
@@ -1001,7 +1001,7 @@
           <a:p>
             <a:fld id="{FC8EB052-1AF3-4EE4-94F8-043828C605DA}" type="datetime1">
               <a:rPr lang="en-US" smtClean="0"/>
-              <a:t>2/14/2024</a:t>
+              <a:t>2/21/2024</a:t>
             </a:fld>
             <a:endParaRPr lang="en-US" dirty="0"/>
           </a:p>
@@ -1266,7 +1266,7 @@
           <a:p>
             <a:fld id="{BC8D9987-6DEC-42EC-AB46-439F38728E88}" type="datetime1">
               <a:rPr lang="en-US" smtClean="0"/>
-              <a:t>2/14/2024</a:t>
+              <a:t>2/21/2024</a:t>
             </a:fld>
             <a:endParaRPr lang="en-US" dirty="0"/>
           </a:p>
@@ -1449,7 +1449,7 @@
           <a:p>
             <a:fld id="{4B586BC6-29DE-42B2-BD18-FFC128C4EBAC}" type="datetime1">
               <a:rPr lang="en-US" smtClean="0"/>
-              <a:t>2/14/2024</a:t>
+              <a:t>2/21/2024</a:t>
             </a:fld>
             <a:endParaRPr lang="en-US" dirty="0"/>
           </a:p>
@@ -1801,7 +1801,7 @@
           <a:p>
             <a:fld id="{6F54A43D-8870-43FB-8170-2ED6C81088B5}" type="datetime1">
               <a:rPr lang="en-US" smtClean="0"/>
-              <a:t>2/14/2024</a:t>
+              <a:t>2/21/2024</a:t>
             </a:fld>
             <a:endParaRPr lang="en-US" dirty="0"/>
           </a:p>
@@ -2085,7 +2085,7 @@
           <a:p>
             <a:fld id="{B0255344-0FEC-4411-9A2A-2990DC9CDB1D}" type="datetime1">
               <a:rPr lang="en-US" smtClean="0"/>
-              <a:t>2/14/2024</a:t>
+              <a:t>2/21/2024</a:t>
             </a:fld>
             <a:endParaRPr lang="en-US" dirty="0"/>
           </a:p>
@@ -2473,7 +2473,7 @@
           <a:p>
             <a:fld id="{BEA429E6-A02C-4C66-B998-A0DF2080DEDA}" type="datetime1">
               <a:rPr lang="en-US" smtClean="0"/>
-              <a:t>2/14/2024</a:t>
+              <a:t>2/21/2024</a:t>
             </a:fld>
             <a:endParaRPr lang="en-US" dirty="0"/>
           </a:p>
@@ -2600,7 +2600,7 @@
           <a:p>
             <a:fld id="{8F7A57E3-1FAE-44EC-9DB4-DE6C3F54A3BB}" type="datetime1">
               <a:rPr lang="en-US" smtClean="0"/>
-              <a:t>2/14/2024</a:t>
+              <a:t>2/21/2024</a:t>
             </a:fld>
             <a:endParaRPr lang="en-US" dirty="0"/>
           </a:p>
@@ -2780,7 +2780,7 @@
           <a:p>
             <a:fld id="{652EFCE8-98C5-4656-B5A3-D5A14BA9FDAB}" type="datetime1">
               <a:rPr lang="en-US" smtClean="0"/>
-              <a:t>2/14/2024</a:t>
+              <a:t>2/21/2024</a:t>
             </a:fld>
             <a:endParaRPr lang="en-US" dirty="0"/>
           </a:p>
@@ -3143,7 +3143,7 @@
           <a:p>
             <a:fld id="{7F32FFCC-AB90-4E81-A00F-2A291EAD6310}" type="datetime1">
               <a:rPr lang="en-US" smtClean="0"/>
-              <a:t>2/14/2024</a:t>
+              <a:t>2/21/2024</a:t>
             </a:fld>
             <a:endParaRPr lang="en-US" dirty="0"/>
           </a:p>
@@ -3534,7 +3534,7 @@
           <a:p>
             <a:fld id="{AB2721FC-EF6D-4EBC-A3FE-F18C97F3ACF8}" type="datetime1">
               <a:rPr lang="en-US" smtClean="0"/>
-              <a:t>2/14/2024</a:t>
+              <a:t>2/21/2024</a:t>
             </a:fld>
             <a:endParaRPr lang="en-US" dirty="0"/>
           </a:p>
@@ -3830,7 +3830,7 @@
           <a:p>
             <a:fld id="{82A738EF-2542-4AE5-B80D-E3DB34695625}" type="datetime1">
               <a:rPr lang="en-US" smtClean="0"/>
-              <a:t>2/14/2024</a:t>
+              <a:t>2/21/2024</a:t>
             </a:fld>
             <a:endParaRPr lang="en-US" dirty="0"/>
           </a:p>
@@ -4382,13 +4382,13 @@
         </p:nvSpPr>
         <p:spPr>
           <a:xfrm>
-            <a:off x="1173289" y="3008928"/>
-            <a:ext cx="9845419" cy="998440"/>
+            <a:off x="2443778" y="2929780"/>
+            <a:ext cx="7108168" cy="998440"/>
           </a:xfrm>
         </p:spPr>
         <p:txBody>
           <a:bodyPr>
-            <a:normAutofit/>
+            <a:normAutofit fontScale="90000"/>
           </a:bodyPr>
           <a:lstStyle/>
           <a:p>
@@ -4406,7 +4406,7 @@
                 <a:latin typeface="Verdana" panose="020B0604030504040204" pitchFamily="34" charset="0"/>
                 <a:ea typeface="Verdana" panose="020B0604030504040204" pitchFamily="34" charset="0"/>
               </a:rPr>
-              <a:t>Ottimizzazione del processo di chiusura contabile attraverso la progettazione e l’implementazione di un sistema di forecasting</a:t>
+              <a:t>Progettazione e sviluppo di un sistema software per l’ottimizzazione del processo di chiusura contabile aziendale</a:t>
             </a:r>
             <a:endParaRPr lang="it-IT" sz="2100" dirty="0">
               <a:solidFill>
@@ -4483,7 +4483,7 @@
             <a:pPr algn="ctr"/>
             <a:r>
               <a:rPr lang="it-IT" sz="1400" dirty="0"/>
-              <a:t>Corso di laurea in ingegneria informatica e robotica</a:t>
+              <a:t>Corso di Laurea Magistrale in Ingegneria Informatica e Robotica</a:t>
             </a:r>
           </a:p>
         </p:txBody>

</xml_diff>